<commit_message>
DOCS: add new changes on .ppt file
</commit_message>
<xml_diff>
--- a/Report notes/design_of_a_gas_diffusion_layer_substrate.pptx
+++ b/Report notes/design_of_a_gas_diffusion_layer_substrate.pptx
@@ -5,11 +5,12 @@
     <p:sldMasterId id="2147483648" r:id="rId1"/>
   </p:sldMasterIdLst>
   <p:sldIdLst>
-    <p:sldId id="256" r:id="rId2"/>
-    <p:sldId id="257" r:id="rId3"/>
-    <p:sldId id="258" r:id="rId4"/>
-    <p:sldId id="259" r:id="rId5"/>
-    <p:sldId id="260" r:id="rId6"/>
+    <p:sldId id="261" r:id="rId2"/>
+    <p:sldId id="256" r:id="rId3"/>
+    <p:sldId id="257" r:id="rId4"/>
+    <p:sldId id="258" r:id="rId5"/>
+    <p:sldId id="259" r:id="rId6"/>
+    <p:sldId id="260" r:id="rId7"/>
   </p:sldIdLst>
   <p:sldSz cx="12192000" cy="6858000"/>
   <p:notesSz cx="6858000" cy="9144000"/>
@@ -247,7 +248,7 @@
           <a:p>
             <a:fld id="{20E3A004-6CC3-45AA-B0CD-ABE8A0D0838A}" type="datetimeFigureOut">
               <a:rPr lang="zh-CN" altLang="en-US" smtClean="0"/>
-              <a:t>2019/5/20</a:t>
+              <a:t>2019/5/29</a:t>
             </a:fld>
             <a:endParaRPr lang="zh-CN" altLang="en-US"/>
           </a:p>
@@ -417,7 +418,7 @@
           <a:p>
             <a:fld id="{20E3A004-6CC3-45AA-B0CD-ABE8A0D0838A}" type="datetimeFigureOut">
               <a:rPr lang="zh-CN" altLang="en-US" smtClean="0"/>
-              <a:t>2019/5/20</a:t>
+              <a:t>2019/5/29</a:t>
             </a:fld>
             <a:endParaRPr lang="zh-CN" altLang="en-US"/>
           </a:p>
@@ -597,7 +598,7 @@
           <a:p>
             <a:fld id="{20E3A004-6CC3-45AA-B0CD-ABE8A0D0838A}" type="datetimeFigureOut">
               <a:rPr lang="zh-CN" altLang="en-US" smtClean="0"/>
-              <a:t>2019/5/20</a:t>
+              <a:t>2019/5/29</a:t>
             </a:fld>
             <a:endParaRPr lang="zh-CN" altLang="en-US"/>
           </a:p>
@@ -767,7 +768,7 @@
           <a:p>
             <a:fld id="{20E3A004-6CC3-45AA-B0CD-ABE8A0D0838A}" type="datetimeFigureOut">
               <a:rPr lang="zh-CN" altLang="en-US" smtClean="0"/>
-              <a:t>2019/5/20</a:t>
+              <a:t>2019/5/29</a:t>
             </a:fld>
             <a:endParaRPr lang="zh-CN" altLang="en-US"/>
           </a:p>
@@ -1013,7 +1014,7 @@
           <a:p>
             <a:fld id="{20E3A004-6CC3-45AA-B0CD-ABE8A0D0838A}" type="datetimeFigureOut">
               <a:rPr lang="zh-CN" altLang="en-US" smtClean="0"/>
-              <a:t>2019/5/20</a:t>
+              <a:t>2019/5/29</a:t>
             </a:fld>
             <a:endParaRPr lang="zh-CN" altLang="en-US"/>
           </a:p>
@@ -1245,7 +1246,7 @@
           <a:p>
             <a:fld id="{20E3A004-6CC3-45AA-B0CD-ABE8A0D0838A}" type="datetimeFigureOut">
               <a:rPr lang="zh-CN" altLang="en-US" smtClean="0"/>
-              <a:t>2019/5/20</a:t>
+              <a:t>2019/5/29</a:t>
             </a:fld>
             <a:endParaRPr lang="zh-CN" altLang="en-US"/>
           </a:p>
@@ -1612,7 +1613,7 @@
           <a:p>
             <a:fld id="{20E3A004-6CC3-45AA-B0CD-ABE8A0D0838A}" type="datetimeFigureOut">
               <a:rPr lang="zh-CN" altLang="en-US" smtClean="0"/>
-              <a:t>2019/5/20</a:t>
+              <a:t>2019/5/29</a:t>
             </a:fld>
             <a:endParaRPr lang="zh-CN" altLang="en-US"/>
           </a:p>
@@ -1730,7 +1731,7 @@
           <a:p>
             <a:fld id="{20E3A004-6CC3-45AA-B0CD-ABE8A0D0838A}" type="datetimeFigureOut">
               <a:rPr lang="zh-CN" altLang="en-US" smtClean="0"/>
-              <a:t>2019/5/20</a:t>
+              <a:t>2019/5/29</a:t>
             </a:fld>
             <a:endParaRPr lang="zh-CN" altLang="en-US"/>
           </a:p>
@@ -1825,7 +1826,7 @@
           <a:p>
             <a:fld id="{20E3A004-6CC3-45AA-B0CD-ABE8A0D0838A}" type="datetimeFigureOut">
               <a:rPr lang="zh-CN" altLang="en-US" smtClean="0"/>
-              <a:t>2019/5/20</a:t>
+              <a:t>2019/5/29</a:t>
             </a:fld>
             <a:endParaRPr lang="zh-CN" altLang="en-US"/>
           </a:p>
@@ -2102,7 +2103,7 @@
           <a:p>
             <a:fld id="{20E3A004-6CC3-45AA-B0CD-ABE8A0D0838A}" type="datetimeFigureOut">
               <a:rPr lang="zh-CN" altLang="en-US" smtClean="0"/>
-              <a:t>2019/5/20</a:t>
+              <a:t>2019/5/29</a:t>
             </a:fld>
             <a:endParaRPr lang="zh-CN" altLang="en-US"/>
           </a:p>
@@ -2355,7 +2356,7 @@
           <a:p>
             <a:fld id="{20E3A004-6CC3-45AA-B0CD-ABE8A0D0838A}" type="datetimeFigureOut">
               <a:rPr lang="zh-CN" altLang="en-US" smtClean="0"/>
-              <a:t>2019/5/20</a:t>
+              <a:t>2019/5/29</a:t>
             </a:fld>
             <a:endParaRPr lang="zh-CN" altLang="en-US"/>
           </a:p>
@@ -2568,7 +2569,7 @@
           <a:p>
             <a:fld id="{20E3A004-6CC3-45AA-B0CD-ABE8A0D0838A}" type="datetimeFigureOut">
               <a:rPr lang="zh-CN" altLang="en-US" smtClean="0"/>
-              <a:t>2019/5/20</a:t>
+              <a:t>2019/5/29</a:t>
             </a:fld>
             <a:endParaRPr lang="zh-CN" altLang="en-US"/>
           </a:p>
@@ -2975,42 +2976,6 @@
       </p:grpSpPr>
       <p:sp>
         <p:nvSpPr>
-          <p:cNvPr id="2" name="文本框 1"/>
-          <p:cNvSpPr txBox="1"/>
-          <p:nvPr/>
-        </p:nvSpPr>
-        <p:spPr>
-          <a:xfrm>
-            <a:off x="169332" y="6366933"/>
-            <a:ext cx="8421511" cy="369332"/>
-          </a:xfrm>
-          <a:prstGeom prst="rect">
-            <a:avLst/>
-          </a:prstGeom>
-          <a:noFill/>
-        </p:spPr>
-        <p:txBody>
-          <a:bodyPr wrap="square" rtlCol="0">
-            <a:spAutoFit/>
-          </a:bodyPr>
-          <a:lstStyle/>
-          <a:p>
-            <a:r>
-              <a:rPr lang="en-US" altLang="zh-CN" b="1" dirty="0">
-                <a:latin typeface="Times New Roman" panose="02020603050405020304" pitchFamily="18" charset="0"/>
-                <a:cs typeface="Times New Roman" panose="02020603050405020304" pitchFamily="18" charset="0"/>
-              </a:rPr>
-              <a:t>https://www.sciencedirect.com/science/article/pii/S0360319913025305?via%3Dihub</a:t>
-            </a:r>
-            <a:endParaRPr lang="zh-CN" altLang="en-US" b="1" dirty="0">
-              <a:latin typeface="Times New Roman" panose="02020603050405020304" pitchFamily="18" charset="0"/>
-              <a:cs typeface="Times New Roman" panose="02020603050405020304" pitchFamily="18" charset="0"/>
-            </a:endParaRPr>
-          </a:p>
-        </p:txBody>
-      </p:sp>
-      <p:sp>
-        <p:nvSpPr>
           <p:cNvPr id="3" name="矩形 15"/>
           <p:cNvSpPr>
             <a:spLocks noChangeArrowheads="1"/>
@@ -3019,8 +2984,8 @@
         </p:nvSpPr>
         <p:spPr bwMode="auto">
           <a:xfrm>
-            <a:off x="10032862" y="-52388"/>
-            <a:ext cx="2159566" cy="738664"/>
+            <a:off x="9726930" y="-52388"/>
+            <a:ext cx="2465498" cy="738664"/>
           </a:xfrm>
           <a:prstGeom prst="rect">
             <a:avLst/>
@@ -3050,7 +3015,7 @@
           </a:extLst>
         </p:spPr>
         <p:txBody>
-          <a:bodyPr wrap="none">
+          <a:bodyPr wrap="square">
             <a:spAutoFit/>
           </a:bodyPr>
           <a:lstStyle>
@@ -3233,9 +3198,20 @@
                 <a:ea typeface="微软雅黑" panose="020B0503020204020204" pitchFamily="34" charset="-122"/>
                 <a:cs typeface="Times New Roman" panose="02020603050405020304" pitchFamily="18" charset="0"/>
               </a:rPr>
-              <a:t>、问题描述</a:t>
-            </a:r>
-            <a:endParaRPr lang="zh-CN" altLang="en-US" sz="2800" b="1" dirty="0">
+              <a:t>、</a:t>
+            </a:r>
+            <a:r>
+              <a:rPr lang="zh-CN" altLang="en-US" sz="2800" b="1" dirty="0" smtClean="0">
+                <a:solidFill>
+                  <a:srgbClr val="3333FF"/>
+                </a:solidFill>
+                <a:latin typeface="Times New Roman" panose="02020603050405020304" pitchFamily="18" charset="0"/>
+                <a:ea typeface="微软雅黑" panose="020B0503020204020204" pitchFamily="34" charset="-122"/>
+                <a:cs typeface="Times New Roman" panose="02020603050405020304" pitchFamily="18" charset="0"/>
+              </a:rPr>
+              <a:t>问题背景</a:t>
+            </a:r>
+            <a:endParaRPr lang="zh-CN" altLang="en-US" sz="2800" b="1" baseline="30000" dirty="0">
               <a:solidFill>
                 <a:srgbClr val="3333FF"/>
               </a:solidFill>
@@ -3257,9 +3233,9 @@
         <p:grpSpPr bwMode="auto">
           <a:xfrm>
             <a:off x="125413" y="731838"/>
-            <a:ext cx="2868612" cy="465137"/>
+            <a:ext cx="2995158" cy="465137"/>
             <a:chOff x="124668" y="732018"/>
-            <a:chExt cx="3120950" cy="465081"/>
+            <a:chExt cx="3258627" cy="465081"/>
           </a:xfrm>
         </p:grpSpPr>
         <p:sp>
@@ -3355,7 +3331,7 @@
           <p:spPr>
             <a:xfrm>
               <a:off x="124668" y="742066"/>
-              <a:ext cx="3035630" cy="455033"/>
+              <a:ext cx="3258627" cy="455033"/>
             </a:xfrm>
             <a:prstGeom prst="rect">
               <a:avLst/>
@@ -3397,7 +3373,7 @@
                 <a:defRPr/>
               </a:pPr>
               <a:r>
-                <a:rPr lang="zh-CN" altLang="en-US" sz="2200" dirty="0">
+                <a:rPr lang="zh-CN" altLang="en-US" sz="2200" dirty="0" smtClean="0">
                   <a:solidFill>
                     <a:schemeClr val="bg1"/>
                   </a:solidFill>
@@ -3427,7 +3403,7 @@
                   <a:ea typeface="微软雅黑" panose="020B0503020204020204" pitchFamily="34" charset="-122"/>
                   <a:cs typeface="Times New Roman" panose="02020603050405020304" pitchFamily="18" charset="0"/>
                 </a:rPr>
-                <a:t>）机理简述</a:t>
+                <a:t>）未来能源规划</a:t>
               </a:r>
               <a:endParaRPr lang="zh-CN" altLang="en-US" sz="2200" dirty="0">
                 <a:solidFill>
@@ -3440,16 +3416,53 @@
           </p:txBody>
         </p:sp>
       </p:grpSp>
+      <p:pic>
+        <p:nvPicPr>
+          <p:cNvPr id="34" name="图片 33"/>
+          <p:cNvPicPr>
+            <a:picLocks noChangeAspect="1"/>
+          </p:cNvPicPr>
+          <p:nvPr/>
+        </p:nvPicPr>
+        <p:blipFill>
+          <a:blip r:embed="rId2">
+            <a:extLst>
+              <a:ext uri="{28A0092B-C50C-407E-A947-70E740481C1C}">
+                <a14:useLocalDpi xmlns:a14="http://schemas.microsoft.com/office/drawing/2010/main" val="0"/>
+              </a:ext>
+            </a:extLst>
+          </a:blip>
+          <a:stretch>
+            <a:fillRect/>
+          </a:stretch>
+        </p:blipFill>
+        <p:spPr>
+          <a:xfrm>
+            <a:off x="342373" y="1973649"/>
+            <a:ext cx="11332880" cy="4427150"/>
+          </a:xfrm>
+          <a:prstGeom prst="rect">
+            <a:avLst/>
+          </a:prstGeom>
+        </p:spPr>
+      </p:pic>
     </p:spTree>
     <p:extLst>
       <p:ext uri="{BB962C8B-B14F-4D97-AF65-F5344CB8AC3E}">
-        <p14:creationId xmlns:p14="http://schemas.microsoft.com/office/powerpoint/2010/main" val="4172416784"/>
+        <p14:creationId xmlns:p14="http://schemas.microsoft.com/office/powerpoint/2010/main" val="1665560648"/>
       </p:ext>
     </p:extLst>
   </p:cSld>
   <p:clrMapOvr>
     <a:masterClrMapping/>
   </p:clrMapOvr>
+  <p:timing>
+    <p:tnLst>
+      <p:par>
+        <p:cTn id="1" dur="indefinite" restart="never" nodeType="tmRoot"/>
+      </p:par>
+    </p:tnLst>
+  </p:timing>
 </p:sld>
 </file>
 
@@ -3480,8 +3493,8 @@
         </p:nvSpPr>
         <p:spPr bwMode="auto">
           <a:xfrm>
-            <a:off x="10032862" y="-52388"/>
-            <a:ext cx="2159566" cy="738664"/>
+            <a:off x="9726930" y="-52388"/>
+            <a:ext cx="2465498" cy="738664"/>
           </a:xfrm>
           <a:prstGeom prst="rect">
             <a:avLst/>
@@ -3511,7 +3524,7 @@
           </a:extLst>
         </p:spPr>
         <p:txBody>
-          <a:bodyPr wrap="none">
+          <a:bodyPr wrap="square">
             <a:spAutoFit/>
           </a:bodyPr>
           <a:lstStyle>
@@ -3694,9 +3707,20 @@
                 <a:ea typeface="微软雅黑" panose="020B0503020204020204" pitchFamily="34" charset="-122"/>
                 <a:cs typeface="Times New Roman" panose="02020603050405020304" pitchFamily="18" charset="0"/>
               </a:rPr>
-              <a:t>、问题描述</a:t>
-            </a:r>
-            <a:endParaRPr lang="zh-CN" altLang="en-US" sz="2800" b="1" dirty="0">
+              <a:t>、</a:t>
+            </a:r>
+            <a:r>
+              <a:rPr lang="zh-CN" altLang="en-US" sz="2800" b="1" dirty="0" smtClean="0">
+                <a:solidFill>
+                  <a:srgbClr val="3333FF"/>
+                </a:solidFill>
+                <a:latin typeface="Times New Roman" panose="02020603050405020304" pitchFamily="18" charset="0"/>
+                <a:ea typeface="微软雅黑" panose="020B0503020204020204" pitchFamily="34" charset="-122"/>
+                <a:cs typeface="Times New Roman" panose="02020603050405020304" pitchFamily="18" charset="0"/>
+              </a:rPr>
+              <a:t>问题背景</a:t>
+            </a:r>
+            <a:endParaRPr lang="zh-CN" altLang="en-US" sz="2800" b="1" baseline="30000" dirty="0">
               <a:solidFill>
                 <a:srgbClr val="3333FF"/>
               </a:solidFill>
@@ -3707,6 +3731,280 @@
           </a:p>
         </p:txBody>
       </p:sp>
+      <p:sp>
+        <p:nvSpPr>
+          <p:cNvPr id="5" name="矩形 4">
+            <a:extLst>
+              <a:ext uri="{FF2B5EF4-FFF2-40B4-BE49-F238E27FC236}">
+                <a16:creationId xmlns:a16="http://schemas.microsoft.com/office/drawing/2014/main" id="{ACFF976D-C10F-4773-B6C0-A8EF394982B5}"/>
+              </a:ext>
+            </a:extLst>
+          </p:cNvPr>
+          <p:cNvSpPr/>
+          <p:nvPr/>
+        </p:nvSpPr>
+        <p:spPr bwMode="auto">
+          <a:xfrm>
+            <a:off x="342373" y="731838"/>
+            <a:ext cx="3434290" cy="455088"/>
+          </a:xfrm>
+          <a:prstGeom prst="rect">
+            <a:avLst/>
+          </a:prstGeom>
+          <a:gradFill flip="none" rotWithShape="0">
+            <a:gsLst>
+              <a:gs pos="0">
+                <a:srgbClr val="0070C0">
+                  <a:shade val="30000"/>
+                  <a:satMod val="115000"/>
+                </a:srgbClr>
+              </a:gs>
+              <a:gs pos="50000">
+                <a:srgbClr val="0070C0">
+                  <a:shade val="67500"/>
+                  <a:satMod val="115000"/>
+                </a:srgbClr>
+              </a:gs>
+              <a:gs pos="100000">
+                <a:srgbClr val="0070C0">
+                  <a:shade val="100000"/>
+                  <a:satMod val="115000"/>
+                </a:srgbClr>
+              </a:gs>
+            </a:gsLst>
+            <a:lin ang="13500000" scaled="1"/>
+            <a:tileRect/>
+          </a:gradFill>
+          <a:scene3d>
+            <a:camera prst="orthographicFront"/>
+            <a:lightRig rig="flat" dir="t"/>
+          </a:scene3d>
+          <a:sp3d prstMaterial="dkEdge">
+            <a:bevelT w="8200" h="38100"/>
+          </a:sp3d>
+        </p:spPr>
+        <p:style>
+          <a:lnRef idx="0">
+            <a:schemeClr val="lt1">
+              <a:hueOff val="0"/>
+              <a:satOff val="0"/>
+              <a:lumOff val="0"/>
+              <a:alphaOff val="0"/>
+            </a:schemeClr>
+          </a:lnRef>
+          <a:fillRef idx="2">
+            <a:scrgbClr r="0" g="0" b="0"/>
+          </a:fillRef>
+          <a:effectRef idx="1">
+            <a:schemeClr val="accent6">
+              <a:shade val="80000"/>
+              <a:hueOff val="0"/>
+              <a:satOff val="0"/>
+              <a:lumOff val="0"/>
+              <a:alphaOff val="0"/>
+            </a:schemeClr>
+          </a:effectRef>
+          <a:fontRef idx="minor">
+            <a:schemeClr val="dk1"/>
+          </a:fontRef>
+        </p:style>
+      </p:sp>
+      <p:sp>
+        <p:nvSpPr>
+          <p:cNvPr id="6" name="文本框 5">
+            <a:extLst>
+              <a:ext uri="{FF2B5EF4-FFF2-40B4-BE49-F238E27FC236}">
+                <a16:creationId xmlns:a16="http://schemas.microsoft.com/office/drawing/2014/main" id="{3583D282-40E0-4567-95F3-C6CD9EBD4A2A}"/>
+              </a:ext>
+            </a:extLst>
+          </p:cNvPr>
+          <p:cNvSpPr txBox="1"/>
+          <p:nvPr/>
+        </p:nvSpPr>
+        <p:spPr bwMode="auto">
+          <a:xfrm>
+            <a:off x="125412" y="741887"/>
+            <a:ext cx="3354387" cy="455088"/>
+          </a:xfrm>
+          <a:prstGeom prst="rect">
+            <a:avLst/>
+          </a:prstGeom>
+          <a:scene3d>
+            <a:camera prst="orthographicFront"/>
+            <a:lightRig rig="flat" dir="t"/>
+          </a:scene3d>
+          <a:sp3d/>
+        </p:spPr>
+        <p:style>
+          <a:lnRef idx="0">
+            <a:scrgbClr r="0" g="0" b="0"/>
+          </a:lnRef>
+          <a:fillRef idx="0">
+            <a:scrgbClr r="0" g="0" b="0"/>
+          </a:fillRef>
+          <a:effectRef idx="0">
+            <a:scrgbClr r="0" g="0" b="0"/>
+          </a:effectRef>
+          <a:fontRef idx="minor">
+            <a:schemeClr val="dk1"/>
+          </a:fontRef>
+        </p:style>
+        <p:txBody>
+          <a:bodyPr lIns="361183" tIns="55880" rIns="55880" bIns="55880" spcCol="1270" anchor="ctr"/>
+          <a:lstStyle/>
+          <a:p>
+            <a:pPr defTabSz="977900">
+              <a:lnSpc>
+                <a:spcPct val="90000"/>
+              </a:lnSpc>
+              <a:spcAft>
+                <a:spcPts val="0"/>
+              </a:spcAft>
+              <a:tabLst>
+                <a:tab pos="444500" algn="l"/>
+              </a:tabLst>
+              <a:defRPr/>
+            </a:pPr>
+            <a:r>
+              <a:rPr lang="zh-CN" altLang="en-US" sz="2200" dirty="0" smtClean="0">
+                <a:solidFill>
+                  <a:schemeClr val="bg1"/>
+                </a:solidFill>
+                <a:latin typeface="Times New Roman" panose="02020603050405020304" pitchFamily="18" charset="0"/>
+                <a:ea typeface="微软雅黑" panose="020B0503020204020204" pitchFamily="34" charset="-122"/>
+                <a:cs typeface="Times New Roman" panose="02020603050405020304" pitchFamily="18" charset="0"/>
+              </a:rPr>
+              <a:t>（</a:t>
+            </a:r>
+            <a:r>
+              <a:rPr lang="en-US" altLang="zh-CN" sz="2200" dirty="0">
+                <a:solidFill>
+                  <a:schemeClr val="bg1"/>
+                </a:solidFill>
+                <a:latin typeface="Times New Roman" panose="02020603050405020304" pitchFamily="18" charset="0"/>
+                <a:ea typeface="微软雅黑" panose="020B0503020204020204" pitchFamily="34" charset="-122"/>
+                <a:cs typeface="Times New Roman" panose="02020603050405020304" pitchFamily="18" charset="0"/>
+              </a:rPr>
+              <a:t>2</a:t>
+            </a:r>
+            <a:r>
+              <a:rPr lang="zh-CN" altLang="en-US" sz="2200" dirty="0" smtClean="0">
+                <a:solidFill>
+                  <a:schemeClr val="bg1"/>
+                </a:solidFill>
+                <a:latin typeface="Times New Roman" panose="02020603050405020304" pitchFamily="18" charset="0"/>
+                <a:ea typeface="微软雅黑" panose="020B0503020204020204" pitchFamily="34" charset="-122"/>
+                <a:cs typeface="Times New Roman" panose="02020603050405020304" pitchFamily="18" charset="0"/>
+              </a:rPr>
+              <a:t>）氢氧燃料电池简介</a:t>
+            </a:r>
+            <a:endParaRPr lang="zh-CN" altLang="en-US" sz="2200" dirty="0">
+              <a:solidFill>
+                <a:schemeClr val="bg1"/>
+              </a:solidFill>
+              <a:latin typeface="微软雅黑" panose="020B0503020204020204" pitchFamily="34" charset="-122"/>
+              <a:ea typeface="微软雅黑" panose="020B0503020204020204" pitchFamily="34" charset="-122"/>
+            </a:endParaRPr>
+          </a:p>
+        </p:txBody>
+      </p:sp>
+      <p:pic>
+        <p:nvPicPr>
+          <p:cNvPr id="9" name="图片 8"/>
+          <p:cNvPicPr>
+            <a:picLocks noChangeAspect="1"/>
+          </p:cNvPicPr>
+          <p:nvPr/>
+        </p:nvPicPr>
+        <p:blipFill>
+          <a:blip r:embed="rId2">
+            <a:extLst>
+              <a:ext uri="{28A0092B-C50C-407E-A947-70E740481C1C}">
+                <a14:useLocalDpi xmlns:a14="http://schemas.microsoft.com/office/drawing/2010/main" val="0"/>
+              </a:ext>
+            </a:extLst>
+          </a:blip>
+          <a:stretch>
+            <a:fillRect/>
+          </a:stretch>
+        </p:blipFill>
+        <p:spPr>
+          <a:xfrm>
+            <a:off x="125412" y="1774454"/>
+            <a:ext cx="5118836" cy="4605602"/>
+          </a:xfrm>
+          <a:prstGeom prst="rect">
+            <a:avLst/>
+          </a:prstGeom>
+        </p:spPr>
+      </p:pic>
+      <p:pic>
+        <p:nvPicPr>
+          <p:cNvPr id="12" name="图片 11"/>
+          <p:cNvPicPr>
+            <a:picLocks noChangeAspect="1"/>
+          </p:cNvPicPr>
+          <p:nvPr/>
+        </p:nvPicPr>
+        <p:blipFill>
+          <a:blip r:embed="rId3">
+            <a:extLst>
+              <a:ext uri="{28A0092B-C50C-407E-A947-70E740481C1C}">
+                <a14:useLocalDpi xmlns:a14="http://schemas.microsoft.com/office/drawing/2010/main" val="0"/>
+              </a:ext>
+            </a:extLst>
+          </a:blip>
+          <a:stretch>
+            <a:fillRect/>
+          </a:stretch>
+        </p:blipFill>
+        <p:spPr>
+          <a:xfrm>
+            <a:off x="5702141" y="969234"/>
+            <a:ext cx="6259295" cy="5888766"/>
+          </a:xfrm>
+          <a:prstGeom prst="rect">
+            <a:avLst/>
+          </a:prstGeom>
+        </p:spPr>
+      </p:pic>
+    </p:spTree>
+    <p:extLst>
+      <p:ext uri="{BB962C8B-B14F-4D97-AF65-F5344CB8AC3E}">
+        <p14:creationId xmlns:p14="http://schemas.microsoft.com/office/powerpoint/2010/main" val="4172416784"/>
+      </p:ext>
+    </p:extLst>
+  </p:cSld>
+  <p:clrMapOvr>
+    <a:masterClrMapping/>
+  </p:clrMapOvr>
+  <p:timing>
+    <p:tnLst>
+      <p:par>
+        <p:cTn id="1" dur="indefinite" restart="never" nodeType="tmRoot"/>
+      </p:par>
+    </p:tnLst>
+  </p:timing>
+</p:sld>
+</file>
+
+<file path=ppt/slides/slide3.xml><?xml version="1.0" encoding="utf-8"?>
+<p:sld xmlns:a="http://schemas.openxmlformats.org/drawingml/2006/main" xmlns:r="http://schemas.openxmlformats.org/officeDocument/2006/relationships" xmlns:p="http://schemas.openxmlformats.org/presentationml/2006/main">
+  <p:cSld>
+    <p:spTree>
+      <p:nvGrpSpPr>
+        <p:cNvPr id="1" name=""/>
+        <p:cNvGrpSpPr/>
+        <p:nvPr/>
+      </p:nvGrpSpPr>
+      <p:grpSpPr>
+        <a:xfrm>
+          <a:off x="0" y="0"/>
+          <a:ext cx="0" cy="0"/>
+          <a:chOff x="0" y="0"/>
+          <a:chExt cx="0" cy="0"/>
+        </a:xfrm>
+      </p:grpSpPr>
       <p:grpSp>
         <p:nvGrpSpPr>
           <p:cNvPr id="4" name="组合 12"/>
@@ -3877,7 +4175,7 @@
                   <a:ea typeface="微软雅黑" panose="020B0503020204020204" pitchFamily="34" charset="-122"/>
                   <a:cs typeface="Times New Roman" panose="02020603050405020304" pitchFamily="18" charset="0"/>
                 </a:rPr>
-                <a:t>2</a:t>
+                <a:t>1</a:t>
               </a:r>
               <a:r>
                 <a:rPr lang="zh-CN" altLang="en-US" sz="2200" dirty="0" smtClean="0">
@@ -3899,7 +4197,7 @@
                   <a:ea typeface="微软雅黑" panose="020B0503020204020204" pitchFamily="34" charset="-122"/>
                   <a:cs typeface="Times New Roman" panose="02020603050405020304" pitchFamily="18" charset="0"/>
                 </a:rPr>
-                <a:t>模型建立</a:t>
+                <a:t>论文简介</a:t>
               </a:r>
               <a:endParaRPr lang="zh-CN" altLang="en-US" sz="2200" dirty="0">
                 <a:solidFill>
@@ -3912,6 +4210,254 @@
           </p:txBody>
         </p:sp>
       </p:grpSp>
+      <p:sp>
+        <p:nvSpPr>
+          <p:cNvPr id="7" name="矩形 15"/>
+          <p:cNvSpPr>
+            <a:spLocks noChangeArrowheads="1"/>
+          </p:cNvSpPr>
+          <p:nvPr/>
+        </p:nvSpPr>
+        <p:spPr bwMode="auto">
+          <a:xfrm>
+            <a:off x="9726930" y="-52388"/>
+            <a:ext cx="2465498" cy="738664"/>
+          </a:xfrm>
+          <a:prstGeom prst="rect">
+            <a:avLst/>
+          </a:prstGeom>
+          <a:noFill/>
+          <a:ln>
+            <a:noFill/>
+          </a:ln>
+          <a:extLst>
+            <a:ext uri="{909E8E84-426E-40DD-AFC4-6F175D3DCCD1}">
+              <a14:hiddenFill xmlns:a14="http://schemas.microsoft.com/office/drawing/2010/main">
+                <a:solidFill>
+                  <a:srgbClr val="FFFFFF"/>
+                </a:solidFill>
+              </a14:hiddenFill>
+            </a:ext>
+            <a:ext uri="{91240B29-F687-4F45-9708-019B960494DF}">
+              <a14:hiddenLine xmlns:a14="http://schemas.microsoft.com/office/drawing/2010/main" w="9525">
+                <a:solidFill>
+                  <a:srgbClr val="000000"/>
+                </a:solidFill>
+                <a:miter lim="800000"/>
+                <a:headEnd/>
+                <a:tailEnd/>
+              </a14:hiddenLine>
+            </a:ext>
+          </a:extLst>
+        </p:spPr>
+        <p:txBody>
+          <a:bodyPr wrap="square">
+            <a:spAutoFit/>
+          </a:bodyPr>
+          <a:lstStyle>
+            <a:lvl1pPr>
+              <a:spcBef>
+                <a:spcPct val="20000"/>
+              </a:spcBef>
+              <a:buFont typeface="Arial" panose="020B0604020202020204" pitchFamily="34" charset="0"/>
+              <a:buChar char="•"/>
+              <a:defRPr sz="3200">
+                <a:solidFill>
+                  <a:schemeClr val="tx1"/>
+                </a:solidFill>
+                <a:latin typeface="Calibri" panose="020F0502020204030204" pitchFamily="34" charset="0"/>
+                <a:ea typeface="宋体" panose="02010600030101010101" pitchFamily="2" charset="-122"/>
+                <a:sym typeface="Calibri" panose="020F0502020204030204" pitchFamily="34" charset="0"/>
+              </a:defRPr>
+            </a:lvl1pPr>
+            <a:lvl2pPr marL="742950" indent="-285750">
+              <a:spcBef>
+                <a:spcPct val="20000"/>
+              </a:spcBef>
+              <a:buFont typeface="Arial" panose="020B0604020202020204" pitchFamily="34" charset="0"/>
+              <a:buChar char="–"/>
+              <a:defRPr sz="2800">
+                <a:solidFill>
+                  <a:schemeClr val="tx1"/>
+                </a:solidFill>
+                <a:latin typeface="Calibri" panose="020F0502020204030204" pitchFamily="34" charset="0"/>
+                <a:ea typeface="宋体" panose="02010600030101010101" pitchFamily="2" charset="-122"/>
+                <a:sym typeface="Calibri" panose="020F0502020204030204" pitchFamily="34" charset="0"/>
+              </a:defRPr>
+            </a:lvl2pPr>
+            <a:lvl3pPr marL="1143000" indent="-228600">
+              <a:spcBef>
+                <a:spcPct val="20000"/>
+              </a:spcBef>
+              <a:buFont typeface="Arial" panose="020B0604020202020204" pitchFamily="34" charset="0"/>
+              <a:buChar char="•"/>
+              <a:defRPr sz="2400">
+                <a:solidFill>
+                  <a:schemeClr val="tx1"/>
+                </a:solidFill>
+                <a:latin typeface="Calibri" panose="020F0502020204030204" pitchFamily="34" charset="0"/>
+                <a:ea typeface="宋体" panose="02010600030101010101" pitchFamily="2" charset="-122"/>
+                <a:sym typeface="Calibri" panose="020F0502020204030204" pitchFamily="34" charset="0"/>
+              </a:defRPr>
+            </a:lvl3pPr>
+            <a:lvl4pPr marL="1600200" indent="-228600">
+              <a:spcBef>
+                <a:spcPct val="20000"/>
+              </a:spcBef>
+              <a:buFont typeface="Arial" panose="020B0604020202020204" pitchFamily="34" charset="0"/>
+              <a:buChar char="–"/>
+              <a:defRPr sz="2000">
+                <a:solidFill>
+                  <a:schemeClr val="tx1"/>
+                </a:solidFill>
+                <a:latin typeface="Calibri" panose="020F0502020204030204" pitchFamily="34" charset="0"/>
+                <a:ea typeface="宋体" panose="02010600030101010101" pitchFamily="2" charset="-122"/>
+                <a:sym typeface="Calibri" panose="020F0502020204030204" pitchFamily="34" charset="0"/>
+              </a:defRPr>
+            </a:lvl4pPr>
+            <a:lvl5pPr marL="2057400" indent="-228600">
+              <a:spcBef>
+                <a:spcPct val="20000"/>
+              </a:spcBef>
+              <a:buFont typeface="Arial" panose="020B0604020202020204" pitchFamily="34" charset="0"/>
+              <a:buChar char="»"/>
+              <a:defRPr sz="2000">
+                <a:solidFill>
+                  <a:schemeClr val="tx1"/>
+                </a:solidFill>
+                <a:latin typeface="Calibri" panose="020F0502020204030204" pitchFamily="34" charset="0"/>
+                <a:ea typeface="宋体" panose="02010600030101010101" pitchFamily="2" charset="-122"/>
+                <a:sym typeface="Calibri" panose="020F0502020204030204" pitchFamily="34" charset="0"/>
+              </a:defRPr>
+            </a:lvl5pPr>
+            <a:lvl6pPr marL="2514600" indent="-228600" eaLnBrk="0" fontAlgn="base" hangingPunct="0">
+              <a:spcBef>
+                <a:spcPct val="20000"/>
+              </a:spcBef>
+              <a:spcAft>
+                <a:spcPct val="0"/>
+              </a:spcAft>
+              <a:buFont typeface="Arial" panose="020B0604020202020204" pitchFamily="34" charset="0"/>
+              <a:buChar char="»"/>
+              <a:defRPr sz="2000">
+                <a:solidFill>
+                  <a:schemeClr val="tx1"/>
+                </a:solidFill>
+                <a:latin typeface="Calibri" panose="020F0502020204030204" pitchFamily="34" charset="0"/>
+                <a:ea typeface="宋体" panose="02010600030101010101" pitchFamily="2" charset="-122"/>
+                <a:sym typeface="Calibri" panose="020F0502020204030204" pitchFamily="34" charset="0"/>
+              </a:defRPr>
+            </a:lvl6pPr>
+            <a:lvl7pPr marL="2971800" indent="-228600" eaLnBrk="0" fontAlgn="base" hangingPunct="0">
+              <a:spcBef>
+                <a:spcPct val="20000"/>
+              </a:spcBef>
+              <a:spcAft>
+                <a:spcPct val="0"/>
+              </a:spcAft>
+              <a:buFont typeface="Arial" panose="020B0604020202020204" pitchFamily="34" charset="0"/>
+              <a:buChar char="»"/>
+              <a:defRPr sz="2000">
+                <a:solidFill>
+                  <a:schemeClr val="tx1"/>
+                </a:solidFill>
+                <a:latin typeface="Calibri" panose="020F0502020204030204" pitchFamily="34" charset="0"/>
+                <a:ea typeface="宋体" panose="02010600030101010101" pitchFamily="2" charset="-122"/>
+                <a:sym typeface="Calibri" panose="020F0502020204030204" pitchFamily="34" charset="0"/>
+              </a:defRPr>
+            </a:lvl7pPr>
+            <a:lvl8pPr marL="3429000" indent="-228600" eaLnBrk="0" fontAlgn="base" hangingPunct="0">
+              <a:spcBef>
+                <a:spcPct val="20000"/>
+              </a:spcBef>
+              <a:spcAft>
+                <a:spcPct val="0"/>
+              </a:spcAft>
+              <a:buFont typeface="Arial" panose="020B0604020202020204" pitchFamily="34" charset="0"/>
+              <a:buChar char="»"/>
+              <a:defRPr sz="2000">
+                <a:solidFill>
+                  <a:schemeClr val="tx1"/>
+                </a:solidFill>
+                <a:latin typeface="Calibri" panose="020F0502020204030204" pitchFamily="34" charset="0"/>
+                <a:ea typeface="宋体" panose="02010600030101010101" pitchFamily="2" charset="-122"/>
+                <a:sym typeface="Calibri" panose="020F0502020204030204" pitchFamily="34" charset="0"/>
+              </a:defRPr>
+            </a:lvl8pPr>
+            <a:lvl9pPr marL="3886200" indent="-228600" eaLnBrk="0" fontAlgn="base" hangingPunct="0">
+              <a:spcBef>
+                <a:spcPct val="20000"/>
+              </a:spcBef>
+              <a:spcAft>
+                <a:spcPct val="0"/>
+              </a:spcAft>
+              <a:buFont typeface="Arial" panose="020B0604020202020204" pitchFamily="34" charset="0"/>
+              <a:buChar char="»"/>
+              <a:defRPr sz="2000">
+                <a:solidFill>
+                  <a:schemeClr val="tx1"/>
+                </a:solidFill>
+                <a:latin typeface="Calibri" panose="020F0502020204030204" pitchFamily="34" charset="0"/>
+                <a:ea typeface="宋体" panose="02010600030101010101" pitchFamily="2" charset="-122"/>
+                <a:sym typeface="Calibri" panose="020F0502020204030204" pitchFamily="34" charset="0"/>
+              </a:defRPr>
+            </a:lvl9pPr>
+          </a:lstStyle>
+          <a:p>
+            <a:pPr>
+              <a:lnSpc>
+                <a:spcPct val="150000"/>
+              </a:lnSpc>
+              <a:spcBef>
+                <a:spcPct val="0"/>
+              </a:spcBef>
+              <a:buFontTx/>
+              <a:buNone/>
+            </a:pPr>
+            <a:r>
+              <a:rPr lang="en-US" altLang="zh-CN" sz="2800" b="1" dirty="0">
+                <a:solidFill>
+                  <a:srgbClr val="3333FF"/>
+                </a:solidFill>
+                <a:latin typeface="Times New Roman" panose="02020603050405020304" pitchFamily="18" charset="0"/>
+                <a:ea typeface="微软雅黑" panose="020B0503020204020204" pitchFamily="34" charset="-122"/>
+                <a:cs typeface="Times New Roman" panose="02020603050405020304" pitchFamily="18" charset="0"/>
+              </a:rPr>
+              <a:t>2</a:t>
+            </a:r>
+            <a:r>
+              <a:rPr lang="zh-CN" altLang="en-US" sz="2800" b="1" dirty="0" smtClean="0">
+                <a:solidFill>
+                  <a:srgbClr val="3333FF"/>
+                </a:solidFill>
+                <a:latin typeface="Times New Roman" panose="02020603050405020304" pitchFamily="18" charset="0"/>
+                <a:ea typeface="微软雅黑" panose="020B0503020204020204" pitchFamily="34" charset="-122"/>
+                <a:cs typeface="Times New Roman" panose="02020603050405020304" pitchFamily="18" charset="0"/>
+              </a:rPr>
+              <a:t>、问题</a:t>
+            </a:r>
+            <a:r>
+              <a:rPr lang="zh-CN" altLang="en-US" sz="2800" b="1" dirty="0">
+                <a:solidFill>
+                  <a:srgbClr val="3333FF"/>
+                </a:solidFill>
+                <a:latin typeface="Times New Roman" panose="02020603050405020304" pitchFamily="18" charset="0"/>
+                <a:ea typeface="微软雅黑" panose="020B0503020204020204" pitchFamily="34" charset="-122"/>
+                <a:cs typeface="Times New Roman" panose="02020603050405020304" pitchFamily="18" charset="0"/>
+              </a:rPr>
+              <a:t>描述</a:t>
+            </a:r>
+            <a:endParaRPr lang="zh-CN" altLang="en-US" sz="2800" b="1" baseline="30000" dirty="0">
+              <a:solidFill>
+                <a:srgbClr val="3333FF"/>
+              </a:solidFill>
+              <a:latin typeface="微软雅黑" panose="020B0503020204020204" pitchFamily="34" charset="-122"/>
+              <a:ea typeface="微软雅黑" panose="020B0503020204020204" pitchFamily="34" charset="-122"/>
+              <a:cs typeface="Times New Roman" panose="02020603050405020304" pitchFamily="18" charset="0"/>
+            </a:endParaRPr>
+          </a:p>
+        </p:txBody>
+      </p:sp>
     </p:spTree>
     <p:extLst>
       <p:ext uri="{BB962C8B-B14F-4D97-AF65-F5344CB8AC3E}">
@@ -3922,10 +4468,17 @@
   <p:clrMapOvr>
     <a:masterClrMapping/>
   </p:clrMapOvr>
+  <p:timing>
+    <p:tnLst>
+      <p:par>
+        <p:cTn id="1" dur="indefinite" restart="never" nodeType="tmRoot"/>
+      </p:par>
+    </p:tnLst>
+  </p:timing>
 </p:sld>
 </file>
 
-<file path=ppt/slides/slide3.xml><?xml version="1.0" encoding="utf-8"?>
+<file path=ppt/slides/slide4.xml><?xml version="1.0" encoding="utf-8"?>
 <p:sld xmlns:a="http://schemas.openxmlformats.org/drawingml/2006/main" xmlns:r="http://schemas.openxmlformats.org/officeDocument/2006/relationships" xmlns:p="http://schemas.openxmlformats.org/presentationml/2006/main">
   <p:cSld>
     <p:spTree>
@@ -4383,10 +4936,17 @@
   <p:clrMapOvr>
     <a:masterClrMapping/>
   </p:clrMapOvr>
+  <p:timing>
+    <p:tnLst>
+      <p:par>
+        <p:cTn id="1" dur="indefinite" restart="never" nodeType="tmRoot"/>
+      </p:par>
+    </p:tnLst>
+  </p:timing>
 </p:sld>
 </file>
 
-<file path=ppt/slides/slide4.xml><?xml version="1.0" encoding="utf-8"?>
+<file path=ppt/slides/slide5.xml><?xml version="1.0" encoding="utf-8"?>
 <p:sld xmlns:a="http://schemas.openxmlformats.org/drawingml/2006/main" xmlns:r="http://schemas.openxmlformats.org/officeDocument/2006/relationships" xmlns:p="http://schemas.openxmlformats.org/presentationml/2006/main">
   <p:cSld>
     <p:spTree>
@@ -4847,7 +5407,7 @@
 </p:sld>
 </file>
 
-<file path=ppt/slides/slide5.xml><?xml version="1.0" encoding="utf-8"?>
+<file path=ppt/slides/slide6.xml><?xml version="1.0" encoding="utf-8"?>
 <p:sld xmlns:a="http://schemas.openxmlformats.org/drawingml/2006/main" xmlns:r="http://schemas.openxmlformats.org/officeDocument/2006/relationships" xmlns:p="http://schemas.openxmlformats.org/presentationml/2006/main">
   <p:cSld>
     <p:spTree>

</xml_diff>